<commit_message>
Auto bot updater Datasphere Course
</commit_message>
<xml_diff>
--- a/Day 4/SAP Build Training Day 4.pptx
+++ b/Day 4/SAP Build Training Day 4.pptx
@@ -12828,8 +12828,8 @@
         </p:nvSpPr>
         <p:spPr>
           <a:xfrm>
-            <a:off x="152400" y="819150"/>
-            <a:ext cx="8763000" cy="2677656"/>
+            <a:off x="76200" y="596376"/>
+            <a:ext cx="8763000" cy="2646878"/>
           </a:xfrm>
           <a:prstGeom prst="rect">
             <a:avLst/>
@@ -12847,17 +12847,17 @@
               <a:buChar char="•"/>
             </a:pPr>
             <a:r>
-              <a:rPr lang="en-IN" sz="1400" dirty="0"/>
+              <a:rPr lang="en-IN" sz="1200" dirty="0"/>
               <a:t>Make sure that 2FA is enabled for your google account (</a:t>
             </a:r>
             <a:r>
-              <a:rPr lang="en-IN" sz="1400" dirty="0">
+              <a:rPr lang="en-IN" sz="1200" dirty="0">
                 <a:hlinkClick r:id="rId2"/>
               </a:rPr>
               <a:t>documentation link</a:t>
             </a:r>
             <a:r>
-              <a:rPr lang="en-IN" sz="1400" dirty="0"/>
+              <a:rPr lang="en-IN" sz="1200" dirty="0"/>
               <a:t>)</a:t>
             </a:r>
           </a:p>
@@ -12867,16 +12867,16 @@
               <a:buChar char="•"/>
             </a:pPr>
             <a:r>
-              <a:rPr lang="en-IN" sz="1400" dirty="0"/>
+              <a:rPr lang="en-IN" sz="1200" dirty="0"/>
               <a:t>Open the link </a:t>
             </a:r>
             <a:r>
-              <a:rPr lang="en-IN" sz="1400" dirty="0">
+              <a:rPr lang="en-IN" sz="1200" dirty="0">
                 <a:hlinkClick r:id="rId3"/>
               </a:rPr>
               <a:t>https://myaccount.google.com/apppasswords</a:t>
             </a:r>
-            <a:endParaRPr lang="en-IN" sz="1400" dirty="0"/>
+            <a:endParaRPr lang="en-IN" sz="1200" dirty="0"/>
           </a:p>
           <a:p>
             <a:pPr marL="285750" indent="-285750">
@@ -12884,59 +12884,38 @@
               <a:buChar char="•"/>
             </a:pPr>
             <a:r>
-              <a:rPr lang="en-IN" sz="1400" dirty="0"/>
+              <a:rPr lang="en-IN" sz="1200" dirty="0"/>
               <a:t>Generate an app password - </a:t>
             </a:r>
             <a:r>
-              <a:rPr lang="en-IN" sz="1400" b="1" dirty="0" err="1">
-                <a:effectLst/>
-                <a:latin typeface="var(--identity-gm3-migration-headline5-font)"/>
-              </a:rPr>
-              <a:t>zlqd</a:t>
-            </a:r>
-            <a:r>
-              <a:rPr lang="en-IN" sz="1400" b="1" dirty="0">
-                <a:effectLst/>
-                <a:latin typeface="var(--identity-gm3-migration-headline5-font)"/>
-              </a:rPr>
+              <a:rPr lang="en-IN" sz="1600" b="1" dirty="0" err="1"/>
+              <a:t>zhxw</a:t>
+            </a:r>
+            <a:r>
+              <a:rPr lang="en-IN" sz="1600" b="1" dirty="0"/>
               <a:t> </a:t>
             </a:r>
             <a:r>
-              <a:rPr lang="en-IN" sz="1400" b="1" dirty="0" err="1">
-                <a:effectLst/>
-                <a:latin typeface="var(--identity-gm3-migration-headline5-font)"/>
-              </a:rPr>
-              <a:t>qyuf</a:t>
-            </a:r>
-            <a:r>
-              <a:rPr lang="en-IN" sz="1400" b="1" dirty="0">
-                <a:effectLst/>
-                <a:latin typeface="var(--identity-gm3-migration-headline5-font)"/>
-              </a:rPr>
+              <a:rPr lang="en-IN" sz="1600" b="1" dirty="0" err="1"/>
+              <a:t>tsls</a:t>
+            </a:r>
+            <a:r>
+              <a:rPr lang="en-IN" sz="1600" b="1" dirty="0"/>
               <a:t> </a:t>
             </a:r>
             <a:r>
-              <a:rPr lang="en-IN" sz="1400" b="1" dirty="0" err="1">
-                <a:effectLst/>
-                <a:latin typeface="var(--identity-gm3-migration-headline5-font)"/>
-              </a:rPr>
-              <a:t>kcpt</a:t>
-            </a:r>
-            <a:r>
-              <a:rPr lang="en-IN" sz="1400" b="1" dirty="0">
-                <a:effectLst/>
-                <a:latin typeface="var(--identity-gm3-migration-headline5-font)"/>
-              </a:rPr>
+              <a:rPr lang="en-IN" sz="1600" b="1" dirty="0" err="1"/>
+              <a:t>emby</a:t>
+            </a:r>
+            <a:r>
+              <a:rPr lang="en-IN" sz="1600" b="1" dirty="0"/>
               <a:t> </a:t>
             </a:r>
             <a:r>
-              <a:rPr lang="en-IN" sz="1400" b="1" dirty="0" err="1">
-                <a:effectLst/>
-                <a:latin typeface="var(--identity-gm3-migration-headline5-font)"/>
-              </a:rPr>
-              <a:t>jujm</a:t>
-            </a:r>
-            <a:endParaRPr lang="en-IN" sz="1400" b="1" dirty="0">
+              <a:rPr lang="en-IN" sz="1600" b="1" dirty="0" err="1"/>
+              <a:t>bhbx</a:t>
+            </a:r>
+            <a:endParaRPr lang="en-IN" sz="1200" b="1" dirty="0">
               <a:effectLst/>
               <a:latin typeface="var(--identity-gm3-migration-headline5-font)"/>
             </a:endParaRPr>
@@ -12947,21 +12926,21 @@
               <a:buChar char="•"/>
             </a:pPr>
             <a:r>
-              <a:rPr lang="en-IN" sz="1400" dirty="0">
+              <a:rPr lang="en-IN" sz="1200" dirty="0">
                 <a:effectLst/>
                 <a:latin typeface="var(--identity-gm3-migration-headline5-font)"/>
               </a:rPr>
               <a:t>Maintain destination using documentation </a:t>
             </a:r>
             <a:r>
-              <a:rPr lang="en-IN" sz="1400" dirty="0">
+              <a:rPr lang="en-IN" sz="1200" dirty="0">
                 <a:effectLst/>
                 <a:latin typeface="var(--identity-gm3-migration-headline5-font)"/>
                 <a:hlinkClick r:id="rId4"/>
               </a:rPr>
               <a:t>here</a:t>
             </a:r>
-            <a:endParaRPr lang="en-IN" sz="1400" dirty="0">
+            <a:endParaRPr lang="en-IN" sz="1200" dirty="0">
               <a:effectLst/>
               <a:latin typeface="var(--identity-gm3-migration-headline5-font)"/>
             </a:endParaRPr>
@@ -12972,18 +12951,18 @@
               <a:buChar char="•"/>
             </a:pPr>
             <a:r>
-              <a:rPr lang="en-IN" sz="1400" dirty="0">
+              <a:rPr lang="en-IN" sz="1200" dirty="0">
                 <a:latin typeface="var(--identity-gm3-migration-headline5-font)"/>
               </a:rPr>
               <a:t>The destination name must be - </a:t>
             </a:r>
             <a:r>
-              <a:rPr lang="en-IN" sz="1400" dirty="0" err="1">
+              <a:rPr lang="en-IN" sz="1200" dirty="0" err="1">
                 <a:latin typeface="var(--identity-gm3-migration-headline5-font)"/>
               </a:rPr>
               <a:t>sap_process_automation_mail</a:t>
             </a:r>
-            <a:endParaRPr lang="en-IN" sz="1400" dirty="0">
+            <a:endParaRPr lang="en-IN" sz="1200" dirty="0">
               <a:latin typeface="var(--identity-gm3-migration-headline5-font)"/>
             </a:endParaRPr>
           </a:p>
@@ -12992,7 +12971,26 @@
               <a:buFont typeface="Arial" panose="020B0604020202020204" pitchFamily="34" charset="0"/>
               <a:buChar char="•"/>
             </a:pPr>
-            <a:endParaRPr lang="en-IN" sz="1400" dirty="0">
+            <a:r>
+              <a:rPr lang="en-IN" sz="1200" dirty="0">
+                <a:latin typeface="var(--identity-gm3-migration-headline5-font)"/>
+                <a:hlinkClick r:id="rId5"/>
+              </a:rPr>
+              <a:t>anubhavsmtpbpa@gmail.com</a:t>
+            </a:r>
+            <a:r>
+              <a:rPr lang="en-IN" sz="1200" dirty="0">
+                <a:latin typeface="var(--identity-gm3-migration-headline5-font)"/>
+              </a:rPr>
+              <a:t> / Bosch@456</a:t>
+            </a:r>
+          </a:p>
+          <a:p>
+            <a:pPr marL="285750" indent="-285750">
+              <a:buFont typeface="Arial" panose="020B0604020202020204" pitchFamily="34" charset="0"/>
+              <a:buChar char="•"/>
+            </a:pPr>
+            <a:endParaRPr lang="en-IN" sz="1200" dirty="0">
               <a:effectLst/>
               <a:latin typeface="var(--identity-gm3-migration-headline5-font)"/>
             </a:endParaRPr>
@@ -13008,16 +13006,16 @@
               <a:buFont typeface="Arial" panose="020B0604020202020204" pitchFamily="34" charset="0"/>
               <a:buChar char="•"/>
             </a:pPr>
-            <a:endParaRPr lang="en-IN" b="1" dirty="0">
+            <a:endParaRPr lang="en-IN" sz="1600" b="1" dirty="0">
               <a:effectLst/>
               <a:latin typeface="var(--identity-gm3-migration-headline5-font)"/>
             </a:endParaRPr>
           </a:p>
           <a:p>
             <a:br>
-              <a:rPr lang="en-IN" dirty="0"/>
+              <a:rPr lang="en-IN" sz="1600" dirty="0"/>
             </a:br>
-            <a:endParaRPr lang="en-IN" dirty="0"/>
+            <a:endParaRPr lang="en-IN" sz="1600" dirty="0"/>
           </a:p>
         </p:txBody>
       </p:sp>
@@ -13036,7 +13034,7 @@
           <p:nvPr/>
         </p:nvPicPr>
         <p:blipFill>
-          <a:blip r:embed="rId5"/>
+          <a:blip r:embed="rId6"/>
           <a:stretch>
             <a:fillRect/>
           </a:stretch>

</xml_diff>